<commit_message>
completion of all project components. Added additional data/notebooks on my search for correlation with subway stations.
</commit_message>
<xml_diff>
--- a/data/presentation_slides.pptx
+++ b/data/presentation_slides.pptx
@@ -110,6 +110,11 @@
       </a:defRPr>
     </a:lvl9pPr>
   </p:defaultTextStyle>
+  <p:extLst>
+    <p:ext uri="{EFAFB233-063F-42B5-8137-9DF3F51BA10A}">
+      <p15:sldGuideLst xmlns:p15="http://schemas.microsoft.com/office/powerpoint/2012/main"/>
+    </p:ext>
+  </p:extLst>
 </p:presentation>
 </file>
 
@@ -4190,7 +4195,7 @@
       </p:grpSpPr>
       <p:sp>
         <p:nvSpPr>
-          <p:cNvPr id="12" name="Rectangle 11">
+          <p:cNvPr id="30" name="Rectangle 23">
             <a:extLst>
               <a:ext uri="{FF2B5EF4-FFF2-40B4-BE49-F238E27FC236}">
                 <a16:creationId xmlns:a16="http://schemas.microsoft.com/office/drawing/2014/main" id="{681577AD-DA5F-48B3-8FB9-5199BA9EE681}"/>
@@ -4272,10 +4277,10 @@
           <a:lstStyle/>
           <a:p>
             <a:r>
-              <a:rPr lang="en-US" dirty="0"/>
+              <a:rPr lang="en-US"/>
               <a:t>Exploratory Data Analysis</a:t>
             </a:r>
-            <a:endParaRPr lang="en-CA" dirty="0"/>
+            <a:endParaRPr lang="en-CA"/>
           </a:p>
         </p:txBody>
       </p:sp>
@@ -4308,7 +4313,7 @@
           <a:lstStyle/>
           <a:p>
             <a:r>
-              <a:rPr lang="en-US" dirty="0">
+              <a:rPr lang="en-US">
                 <a:solidFill>
                   <a:srgbClr val="FFFFFF"/>
                 </a:solidFill>
@@ -4318,7 +4323,7 @@
           </a:p>
           <a:p>
             <a:r>
-              <a:rPr lang="en-US" dirty="0">
+              <a:rPr lang="en-US">
                 <a:solidFill>
                   <a:srgbClr val="FFFFFF"/>
                 </a:solidFill>
@@ -4329,7 +4334,7 @@
           <a:p>
             <a:pPr lvl="1"/>
             <a:r>
-              <a:rPr lang="en-US" dirty="0">
+              <a:rPr lang="en-US">
                 <a:solidFill>
                   <a:srgbClr val="FFFFFF"/>
                 </a:solidFill>
@@ -4341,10 +4346,10 @@
       </p:sp>
       <p:pic>
         <p:nvPicPr>
-          <p:cNvPr id="5" name="Content Placeholder 4">
+          <p:cNvPr id="10" name="Picture 9">
             <a:extLst>
               <a:ext uri="{FF2B5EF4-FFF2-40B4-BE49-F238E27FC236}">
-                <a16:creationId xmlns:a16="http://schemas.microsoft.com/office/drawing/2014/main" id="{8AC7BDC7-86A4-F869-5521-13D9B6154537}"/>
+                <a16:creationId xmlns:a16="http://schemas.microsoft.com/office/drawing/2014/main" id="{D4E2F245-4F05-D1A0-4B23-0C2A0AA2AD19}"/>
               </a:ext>
             </a:extLst>
           </p:cNvPr>
@@ -4361,7 +4366,7 @@
         </p:blipFill>
         <p:spPr>
           <a:xfrm>
-            <a:off x="5165454" y="1304959"/>
+            <a:off x="5137463" y="1300883"/>
             <a:ext cx="6193767" cy="4248081"/>
           </a:xfrm>
           <a:prstGeom prst="rect">
@@ -5945,11 +5950,8 @@
                   <a:schemeClr val="tx1"/>
                 </a:solidFill>
               </a:rPr>
-              <a:t>Educational institutions, tourist spots, shopping areas should be looked into for this</a:t>
-            </a:r>
-          </a:p>
-          <a:p>
-            <a:pPr lvl="1"/>
+              <a:t>Educational institutions, tourist spots, shopping areas should be investigated</a:t>
+            </a:r>
             <a:endParaRPr lang="en-CA" dirty="0">
               <a:solidFill>
                 <a:schemeClr val="tx1"/>

</xml_diff>

<commit_message>
fixed mistake in presentation ppt
</commit_message>
<xml_diff>
--- a/data/presentation_slides.pptx
+++ b/data/presentation_slides.pptx
@@ -342,7 +342,7 @@
           <a:p>
             <a:fld id="{BE05EC7E-34D1-4D6C-B578-108EC6B1AE2C}" type="datetimeFigureOut">
               <a:rPr lang="en-CA" smtClean="0"/>
-              <a:t>2023-01-29</a:t>
+              <a:t>2023-01-30</a:t>
             </a:fld>
             <a:endParaRPr lang="en-CA"/>
           </a:p>
@@ -512,7 +512,7 @@
           <a:p>
             <a:fld id="{BE05EC7E-34D1-4D6C-B578-108EC6B1AE2C}" type="datetimeFigureOut">
               <a:rPr lang="en-CA" smtClean="0"/>
-              <a:t>2023-01-29</a:t>
+              <a:t>2023-01-30</a:t>
             </a:fld>
             <a:endParaRPr lang="en-CA"/>
           </a:p>
@@ -692,7 +692,7 @@
           <a:p>
             <a:fld id="{BE05EC7E-34D1-4D6C-B578-108EC6B1AE2C}" type="datetimeFigureOut">
               <a:rPr lang="en-CA" smtClean="0"/>
-              <a:t>2023-01-29</a:t>
+              <a:t>2023-01-30</a:t>
             </a:fld>
             <a:endParaRPr lang="en-CA"/>
           </a:p>
@@ -862,7 +862,7 @@
           <a:p>
             <a:fld id="{BE05EC7E-34D1-4D6C-B578-108EC6B1AE2C}" type="datetimeFigureOut">
               <a:rPr lang="en-CA" smtClean="0"/>
-              <a:t>2023-01-29</a:t>
+              <a:t>2023-01-30</a:t>
             </a:fld>
             <a:endParaRPr lang="en-CA"/>
           </a:p>
@@ -1120,7 +1120,7 @@
           <a:p>
             <a:fld id="{BE05EC7E-34D1-4D6C-B578-108EC6B1AE2C}" type="datetimeFigureOut">
               <a:rPr lang="en-CA" smtClean="0"/>
-              <a:t>2023-01-29</a:t>
+              <a:t>2023-01-30</a:t>
             </a:fld>
             <a:endParaRPr lang="en-CA"/>
           </a:p>
@@ -1408,7 +1408,7 @@
           <a:p>
             <a:fld id="{BE05EC7E-34D1-4D6C-B578-108EC6B1AE2C}" type="datetimeFigureOut">
               <a:rPr lang="en-CA" smtClean="0"/>
-              <a:t>2023-01-29</a:t>
+              <a:t>2023-01-30</a:t>
             </a:fld>
             <a:endParaRPr lang="en-CA"/>
           </a:p>
@@ -1850,7 +1850,7 @@
           <a:p>
             <a:fld id="{BE05EC7E-34D1-4D6C-B578-108EC6B1AE2C}" type="datetimeFigureOut">
               <a:rPr lang="en-CA" smtClean="0"/>
-              <a:t>2023-01-29</a:t>
+              <a:t>2023-01-30</a:t>
             </a:fld>
             <a:endParaRPr lang="en-CA"/>
           </a:p>
@@ -1968,7 +1968,7 @@
           <a:p>
             <a:fld id="{BE05EC7E-34D1-4D6C-B578-108EC6B1AE2C}" type="datetimeFigureOut">
               <a:rPr lang="en-CA" smtClean="0"/>
-              <a:t>2023-01-29</a:t>
+              <a:t>2023-01-30</a:t>
             </a:fld>
             <a:endParaRPr lang="en-CA"/>
           </a:p>
@@ -2063,7 +2063,7 @@
           <a:p>
             <a:fld id="{BE05EC7E-34D1-4D6C-B578-108EC6B1AE2C}" type="datetimeFigureOut">
               <a:rPr lang="en-CA" smtClean="0"/>
-              <a:t>2023-01-29</a:t>
+              <a:t>2023-01-30</a:t>
             </a:fld>
             <a:endParaRPr lang="en-CA"/>
           </a:p>
@@ -2351,7 +2351,7 @@
           <a:p>
             <a:fld id="{BE05EC7E-34D1-4D6C-B578-108EC6B1AE2C}" type="datetimeFigureOut">
               <a:rPr lang="en-CA" smtClean="0"/>
-              <a:t>2023-01-29</a:t>
+              <a:t>2023-01-30</a:t>
             </a:fld>
             <a:endParaRPr lang="en-CA"/>
           </a:p>
@@ -2624,7 +2624,7 @@
           <a:p>
             <a:fld id="{BE05EC7E-34D1-4D6C-B578-108EC6B1AE2C}" type="datetimeFigureOut">
               <a:rPr lang="en-CA" smtClean="0"/>
-              <a:t>2023-01-29</a:t>
+              <a:t>2023-01-30</a:t>
             </a:fld>
             <a:endParaRPr lang="en-CA"/>
           </a:p>
@@ -2921,7 +2921,7 @@
           <a:p>
             <a:fld id="{BE05EC7E-34D1-4D6C-B578-108EC6B1AE2C}" type="datetimeFigureOut">
               <a:rPr lang="en-CA" smtClean="0"/>
-              <a:t>2023-01-29</a:t>
+              <a:t>2023-01-30</a:t>
             </a:fld>
             <a:endParaRPr lang="en-CA"/>
           </a:p>
@@ -4120,7 +4120,7 @@
                   <a:srgbClr val="FFFFFF"/>
                 </a:solidFill>
               </a:rPr>
-              <a:t>Looks left skewed as there are very few locations with a high number of bikes</a:t>
+              <a:t>Looks right skewed as there are very few locations with a high number of bikes</a:t>
             </a:r>
           </a:p>
         </p:txBody>

</xml_diff>